<commit_message>
plot tweaks; add image for article heading
</commit_message>
<xml_diff>
--- a/for_article/photoshop_work.pptx
+++ b/for_article/photoshop_work.pptx
@@ -104,6 +104,11 @@
       </a:defRPr>
     </a:lvl9pPr>
   </p:defaultTextStyle>
+  <p:extLst>
+    <p:ext uri="{EFAFB233-063F-42B5-8137-9DF3F51BA10A}">
+      <p15:sldGuideLst xmlns:p15="http://schemas.microsoft.com/office/powerpoint/2012/main"/>
+    </p:ext>
+  </p:extLst>
 </p:presentation>
 </file>
 
@@ -3335,10 +3340,10 @@
         </p:nvGrpSpPr>
         <p:grpSpPr>
           <a:xfrm>
-            <a:off x="908274" y="1429922"/>
-            <a:ext cx="10375453" cy="3998157"/>
-            <a:chOff x="908274" y="1429922"/>
-            <a:chExt cx="10375453" cy="3998157"/>
+            <a:off x="1409700" y="1284959"/>
+            <a:ext cx="9874027" cy="3282646"/>
+            <a:chOff x="1409700" y="1284959"/>
+            <a:chExt cx="9874027" cy="3282646"/>
           </a:xfrm>
         </p:grpSpPr>
         <p:pic>
@@ -3372,13 +3377,13 @@
                 </a:ext>
               </a:extLst>
             </a:blip>
-            <a:srcRect l="6241" t="18675" r="7224" b="14631"/>
+            <a:srcRect l="10875" t="18675" r="7224" b="28984"/>
             <a:stretch/>
           </p:blipFill>
           <p:spPr>
             <a:xfrm>
-              <a:off x="908274" y="1429922"/>
-              <a:ext cx="10375453" cy="3998157"/>
+              <a:off x="1463919" y="1429923"/>
+              <a:ext cx="9819808" cy="3137682"/>
             </a:xfrm>
             <a:prstGeom prst="rect">
               <a:avLst/>
@@ -3404,7 +3409,7 @@
           </p:nvSpPr>
           <p:spPr>
             <a:xfrm>
-              <a:off x="2371773" y="1640637"/>
+              <a:off x="2494866" y="1284959"/>
               <a:ext cx="7448454" cy="3282646"/>
             </a:xfrm>
             <a:prstGeom prst="rect">
@@ -3461,7 +3466,7 @@
           </p:nvSpPr>
           <p:spPr>
             <a:xfrm>
-              <a:off x="1339362" y="2028617"/>
+              <a:off x="1409700" y="1640637"/>
               <a:ext cx="9513277" cy="2800767"/>
             </a:xfrm>
             <a:prstGeom prst="rect">

</xml_diff>